<commit_message>
Update Presentation du projet SFL2  (Pierre) Revue 2.pptx
</commit_message>
<xml_diff>
--- a/Revue n2/Presentation du projet SFL2  (Pierre) Revue 2.pptx
+++ b/Revue n2/Presentation du projet SFL2  (Pierre) Revue 2.pptx
@@ -17,7 +17,7 @@
     <p:sldId id="263" r:id="rId14"/>
     <p:sldId id="265" r:id="rId15"/>
     <p:sldId id="266" r:id="rId16"/>
-    <p:sldId id="272" r:id="rId17"/>
+    <p:sldId id="273" r:id="rId17"/>
   </p:sldIdLst>
   <p:sldSz cx="12192000" cy="6858000"/>
   <p:notesSz cx="6858000" cy="9144000"/>
@@ -124,10 +124,6 @@
 </p:presentation>
 </file>
 
-<file path=ppt/revisionInfo.xml><?xml version="1.0" encoding="utf-8"?>
-<p1510:revInfo xmlns:a="http://schemas.openxmlformats.org/drawingml/2006/main" xmlns:r="http://schemas.openxmlformats.org/officeDocument/2006/relationships" xmlns:p1510="http://schemas.microsoft.com/office/powerpoint/2015/10/main"/>
-</file>
-
 <file path=ppt/slideLayouts/slideLayout1.xml><?xml version="1.0" encoding="utf-8"?>
 <p:sldLayout xmlns:a="http://schemas.openxmlformats.org/drawingml/2006/main" xmlns:r="http://schemas.openxmlformats.org/officeDocument/2006/relationships" xmlns:p="http://schemas.openxmlformats.org/presentationml/2006/main" type="title" preserve="1">
   <p:cSld name="Diapositive de titre">
@@ -223,7 +219,7 @@
           <a:effectLst/>
           <a:extLst>
             <a:ext uri="{91240B29-F687-4f45-9708-019B960494DF}">
-              <a14:hiddenLine xmlns="" xmlns:a14="http://schemas.microsoft.com/office/drawing/2010/main" w="9525">
+              <a14:hiddenLine xmlns:a14="http://schemas.microsoft.com/office/drawing/2010/main" xmlns="" w="9525">
                 <a:solidFill>
                   <a:srgbClr val="000000"/>
                 </a:solidFill>
@@ -416,7 +412,7 @@
             <a:fld id="{08B9EBBA-996F-894A-B54A-D6246ED52CEA}" type="datetimeFigureOut">
               <a:rPr lang="en-US" dirty="0"/>
               <a:pPr/>
-              <a:t>2/5/2019</a:t>
+              <a:t>2/6/2019</a:t>
             </a:fld>
             <a:endParaRPr lang="en-US" dirty="0"/>
           </a:p>
@@ -731,7 +727,7 @@
             <a:fld id="{18C79C5D-2A6F-F04D-97DA-BEF2467B64E4}" type="datetimeFigureOut">
               <a:rPr lang="en-US" dirty="0"/>
               <a:pPr/>
-              <a:t>2/5/2019</a:t>
+              <a:t>2/6/2019</a:t>
             </a:fld>
             <a:endParaRPr lang="en-US" dirty="0"/>
           </a:p>
@@ -1216,7 +1212,7 @@
             <a:fld id="{8DFA1846-DA80-1C48-A609-854EA85C59AD}" type="datetimeFigureOut">
               <a:rPr lang="en-US" dirty="0"/>
               <a:pPr/>
-              <a:t>2/5/2019</a:t>
+              <a:t>2/6/2019</a:t>
             </a:fld>
             <a:endParaRPr lang="en-US" dirty="0"/>
           </a:p>
@@ -1582,7 +1578,7 @@
             <a:fld id="{FBF54567-0DE4-3F47-BF90-CB84690072F9}" type="datetimeFigureOut">
               <a:rPr lang="en-US" dirty="0"/>
               <a:pPr/>
-              <a:t>2/5/2019</a:t>
+              <a:t>2/6/2019</a:t>
             </a:fld>
             <a:endParaRPr lang="en-US" dirty="0"/>
           </a:p>
@@ -1733,7 +1729,7 @@
           <a:ln/>
           <a:extLst>
             <a:ext uri="{91240B29-F687-4f45-9708-019B960494DF}">
-              <a14:hiddenLine xmlns="" xmlns:a14="http://schemas.microsoft.com/office/drawing/2010/main" w="9525">
+              <a14:hiddenLine xmlns:a14="http://schemas.microsoft.com/office/drawing/2010/main" xmlns="" w="9525">
                 <a:solidFill>
                   <a:srgbClr val="000000"/>
                 </a:solidFill>
@@ -1852,7 +1848,7 @@
             <a:fld id="{C6C52C72-DE31-F449-A4ED-4C594FD91407}" type="datetimeFigureOut">
               <a:rPr lang="en-US" dirty="0"/>
               <a:pPr/>
-              <a:t>2/5/2019</a:t>
+              <a:t>2/6/2019</a:t>
             </a:fld>
             <a:endParaRPr lang="en-US" dirty="0"/>
           </a:p>
@@ -2005,7 +2001,7 @@
           <a:ln/>
           <a:extLst>
             <a:ext uri="{91240B29-F687-4f45-9708-019B960494DF}">
-              <a14:hiddenLine xmlns="" xmlns:a14="http://schemas.microsoft.com/office/drawing/2010/main" w="9525">
+              <a14:hiddenLine xmlns:a14="http://schemas.microsoft.com/office/drawing/2010/main" xmlns="" w="9525">
                 <a:solidFill>
                   <a:srgbClr val="000000"/>
                 </a:solidFill>
@@ -2134,7 +2130,7 @@
             <a:fld id="{ED62726E-379B-B349-9EED-81ED093FA806}" type="datetimeFigureOut">
               <a:rPr lang="en-US" dirty="0"/>
               <a:pPr/>
-              <a:t>2/5/2019</a:t>
+              <a:t>2/6/2019</a:t>
             </a:fld>
             <a:endParaRPr lang="en-US" dirty="0"/>
           </a:p>
@@ -2285,7 +2281,7 @@
           <a:ln/>
           <a:extLst>
             <a:ext uri="{91240B29-F687-4f45-9708-019B960494DF}">
-              <a14:hiddenLine xmlns="" xmlns:a14="http://schemas.microsoft.com/office/drawing/2010/main" w="9525">
+              <a14:hiddenLine xmlns:a14="http://schemas.microsoft.com/office/drawing/2010/main" xmlns="" w="9525">
                 <a:solidFill>
                   <a:srgbClr val="000000"/>
                 </a:solidFill>
@@ -2414,7 +2410,7 @@
             <a:fld id="{9B3A1323-8D79-1946-B0D7-40001CF92E9D}" type="datetimeFigureOut">
               <a:rPr lang="en-US" dirty="0"/>
               <a:pPr/>
-              <a:t>2/5/2019</a:t>
+              <a:t>2/6/2019</a:t>
             </a:fld>
             <a:endParaRPr lang="en-US" dirty="0"/>
           </a:p>
@@ -2754,7 +2750,7 @@
             <a:fld id="{8DFA1846-DA80-1C48-A609-854EA85C59AD}" type="datetimeFigureOut">
               <a:rPr lang="en-US" dirty="0"/>
               <a:pPr/>
-              <a:t>2/5/2019</a:t>
+              <a:t>2/6/2019</a:t>
             </a:fld>
             <a:endParaRPr lang="en-US" dirty="0"/>
           </a:p>
@@ -2905,7 +2901,7 @@
           <a:ln/>
           <a:extLst>
             <a:ext uri="{91240B29-F687-4f45-9708-019B960494DF}">
-              <a14:hiddenLine xmlns="" xmlns:a14="http://schemas.microsoft.com/office/drawing/2010/main" w="9525">
+              <a14:hiddenLine xmlns:a14="http://schemas.microsoft.com/office/drawing/2010/main" xmlns="" w="9525">
                 <a:solidFill>
                   <a:srgbClr val="000000"/>
                 </a:solidFill>
@@ -3090,7 +3086,7 @@
             <a:fld id="{57302355-E14B-8545-A8F8-0FE83CC9D524}" type="datetimeFigureOut">
               <a:rPr lang="en-US" dirty="0"/>
               <a:pPr/>
-              <a:t>2/5/2019</a:t>
+              <a:t>2/6/2019</a:t>
             </a:fld>
             <a:endParaRPr lang="en-US" dirty="0"/>
           </a:p>
@@ -3241,7 +3237,7 @@
           <a:ln/>
           <a:extLst>
             <a:ext uri="{91240B29-F687-4f45-9708-019B960494DF}">
-              <a14:hiddenLine xmlns="" xmlns:a14="http://schemas.microsoft.com/office/drawing/2010/main" w="9525">
+              <a14:hiddenLine xmlns:a14="http://schemas.microsoft.com/office/drawing/2010/main" xmlns="" w="9525">
                 <a:solidFill>
                   <a:srgbClr val="000000"/>
                 </a:solidFill>
@@ -3564,7 +3560,7 @@
             <a:fld id="{02640F58-564D-2B4F-AE67-E407BA4FCF45}" type="datetimeFigureOut">
               <a:rPr lang="en-US" dirty="0"/>
               <a:pPr/>
-              <a:t>2/5/2019</a:t>
+              <a:t>2/6/2019</a:t>
             </a:fld>
             <a:endParaRPr lang="en-US" dirty="0"/>
           </a:p>
@@ -3715,7 +3711,7 @@
           <a:ln/>
           <a:extLst>
             <a:ext uri="{91240B29-F687-4f45-9708-019B960494DF}">
-              <a14:hiddenLine xmlns="" xmlns:a14="http://schemas.microsoft.com/office/drawing/2010/main" w="9525">
+              <a14:hiddenLine xmlns:a14="http://schemas.microsoft.com/office/drawing/2010/main" xmlns="" w="9525">
                 <a:solidFill>
                   <a:srgbClr val="000000"/>
                 </a:solidFill>
@@ -3782,7 +3778,7 @@
             <a:fld id="{F13A34C8-038E-2045-AF43-DF7DBB8E0E9E}" type="datetimeFigureOut">
               <a:rPr lang="en-US" dirty="0"/>
               <a:pPr/>
-              <a:t>2/5/2019</a:t>
+              <a:t>2/6/2019</a:t>
             </a:fld>
             <a:endParaRPr lang="en-US" dirty="0"/>
           </a:p>
@@ -3874,7 +3870,7 @@
             <a:fld id="{8818C68F-D26B-8F47-958C-23B49CF8A634}" type="datetimeFigureOut">
               <a:rPr lang="en-US" dirty="0"/>
               <a:pPr/>
-              <a:t>2/5/2019</a:t>
+              <a:t>2/6/2019</a:t>
             </a:fld>
             <a:endParaRPr lang="en-US" dirty="0"/>
           </a:p>
@@ -4138,7 +4134,7 @@
           <a:ln/>
           <a:extLst>
             <a:ext uri="{91240B29-F687-4f45-9708-019B960494DF}">
-              <a14:hiddenLine xmlns="" xmlns:a14="http://schemas.microsoft.com/office/drawing/2010/main" w="9525">
+              <a14:hiddenLine xmlns:a14="http://schemas.microsoft.com/office/drawing/2010/main" xmlns="" w="9525">
                 <a:solidFill>
                   <a:srgbClr val="000000"/>
                 </a:solidFill>
@@ -4338,7 +4334,7 @@
             <a:fld id="{D0DF5E60-9974-AC48-9591-99C2BB44B7CF}" type="datetimeFigureOut">
               <a:rPr lang="en-US" dirty="0"/>
               <a:pPr/>
-              <a:t>2/5/2019</a:t>
+              <a:t>2/6/2019</a:t>
             </a:fld>
             <a:endParaRPr lang="en-US" dirty="0"/>
           </a:p>
@@ -4648,7 +4644,7 @@
             <a:fld id="{18C79C5D-2A6F-F04D-97DA-BEF2467B64E4}" type="datetimeFigureOut">
               <a:rPr lang="en-US" dirty="0"/>
               <a:pPr/>
-              <a:t>2/5/2019</a:t>
+              <a:t>2/6/2019</a:t>
             </a:fld>
             <a:endParaRPr lang="en-US" dirty="0"/>
           </a:p>
@@ -4915,7 +4911,7 @@
             <a:fld id="{09B482E8-6E0E-1B4F-B1FD-C69DB9E858D9}" type="datetimeFigureOut">
               <a:rPr lang="en-US" dirty="0"/>
               <a:pPr/>
-              <a:t>2/5/2019</a:t>
+              <a:t>2/6/2019</a:t>
             </a:fld>
             <a:endParaRPr lang="en-US" dirty="0"/>
           </a:p>
@@ -5480,7 +5476,7 @@
                 <a16:creationId xmlns:a16="http://schemas.microsoft.com/office/drawing/2014/main" id="{E7597382-59B5-427B-9E49-55383F0A5561}"/>
               </a:ext>
               <a:ext uri="{C183D7F6-B498-43B3-948B-1728B52AA6E4}">
-                <adec:decorative xmlns:adec="http://schemas.microsoft.com/office/drawing/2017/decorative" xmlns="" val="1"/>
+                <adec:decorative xmlns:adec="http://schemas.microsoft.com/office/drawing/2017/decorative" val="1"/>
               </a:ext>
             </a:extLst>
           </p:cNvPr>
@@ -5568,7 +5564,7 @@
           </a:ln>
           <a:extLst>
             <a:ext uri="{91240B29-F687-4f45-9708-019B960494DF}">
-              <a14:hiddenLine xmlns:a14="http://schemas.microsoft.com/office/drawing/2010/main" xmlns:p14="http://schemas.microsoft.com/office/powerpoint/2010/main" xmlns:a16="http://schemas.microsoft.com/office/drawing/2014/main" xmlns="" w="9525">
+              <a14:hiddenLine xmlns="" xmlns:a16="http://schemas.microsoft.com/office/drawing/2014/main" xmlns:p14="http://schemas.microsoft.com/office/powerpoint/2010/main" xmlns:a14="http://schemas.microsoft.com/office/drawing/2010/main" w="9525">
                 <a:solidFill>
                   <a:srgbClr val="000000"/>
                 </a:solidFill>
@@ -5602,7 +5598,7 @@
                 <a16:creationId xmlns:a16="http://schemas.microsoft.com/office/drawing/2014/main" id="{26471DC7-FA6E-40EF-A167-93BB0BCE16AD}"/>
               </a:ext>
               <a:ext uri="{C183D7F6-B498-43B3-948B-1728B52AA6E4}">
-                <adec:decorative xmlns:adec="http://schemas.microsoft.com/office/drawing/2017/decorative" xmlns="" val="1"/>
+                <adec:decorative xmlns:adec="http://schemas.microsoft.com/office/drawing/2017/decorative" val="1"/>
               </a:ext>
             </a:extLst>
           </p:cNvPr>
@@ -5777,7 +5773,7 @@
                 <a16:creationId xmlns:a16="http://schemas.microsoft.com/office/drawing/2014/main" id="{E7597382-59B5-427B-9E49-55383F0A5561}"/>
               </a:ext>
               <a:ext uri="{C183D7F6-B498-43B3-948B-1728B52AA6E4}">
-                <adec:decorative xmlns:adec="http://schemas.microsoft.com/office/drawing/2017/decorative" xmlns="" val="1"/>
+                <adec:decorative xmlns:adec="http://schemas.microsoft.com/office/drawing/2017/decorative" val="1"/>
               </a:ext>
             </a:extLst>
           </p:cNvPr>
@@ -5865,7 +5861,7 @@
           </a:ln>
           <a:extLst>
             <a:ext uri="{91240B29-F687-4f45-9708-019B960494DF}">
-              <a14:hiddenLine xmlns:a14="http://schemas.microsoft.com/office/drawing/2010/main" xmlns:p14="http://schemas.microsoft.com/office/powerpoint/2010/main" xmlns:a16="http://schemas.microsoft.com/office/drawing/2014/main" xmlns="" w="9525">
+              <a14:hiddenLine xmlns="" xmlns:a16="http://schemas.microsoft.com/office/drawing/2014/main" xmlns:p14="http://schemas.microsoft.com/office/powerpoint/2010/main" xmlns:a14="http://schemas.microsoft.com/office/drawing/2010/main" w="9525">
                 <a:solidFill>
                   <a:srgbClr val="000000"/>
                 </a:solidFill>
@@ -5899,7 +5895,7 @@
                 <a16:creationId xmlns:a16="http://schemas.microsoft.com/office/drawing/2014/main" id="{26471DC7-FA6E-40EF-A167-93BB0BCE16AD}"/>
               </a:ext>
               <a:ext uri="{C183D7F6-B498-43B3-948B-1728B52AA6E4}">
-                <adec:decorative xmlns:adec="http://schemas.microsoft.com/office/drawing/2017/decorative" xmlns="" val="1"/>
+                <adec:decorative xmlns:adec="http://schemas.microsoft.com/office/drawing/2017/decorative" val="1"/>
               </a:ext>
             </a:extLst>
           </p:cNvPr>
@@ -6071,7 +6067,7 @@
                 <a16:creationId xmlns:a16="http://schemas.microsoft.com/office/drawing/2014/main" id="{E7597382-59B5-427B-9E49-55383F0A5561}"/>
               </a:ext>
               <a:ext uri="{C183D7F6-B498-43B3-948B-1728B52AA6E4}">
-                <adec:decorative xmlns:adec="http://schemas.microsoft.com/office/drawing/2017/decorative" xmlns="" val="1"/>
+                <adec:decorative xmlns:adec="http://schemas.microsoft.com/office/drawing/2017/decorative" val="1"/>
               </a:ext>
             </a:extLst>
           </p:cNvPr>
@@ -6159,7 +6155,7 @@
           </a:ln>
           <a:extLst>
             <a:ext uri="{91240B29-F687-4f45-9708-019B960494DF}">
-              <a14:hiddenLine xmlns:a14="http://schemas.microsoft.com/office/drawing/2010/main" xmlns:p14="http://schemas.microsoft.com/office/powerpoint/2010/main" xmlns:a16="http://schemas.microsoft.com/office/drawing/2014/main" xmlns="" w="9525">
+              <a14:hiddenLine xmlns="" xmlns:a16="http://schemas.microsoft.com/office/drawing/2014/main" xmlns:p14="http://schemas.microsoft.com/office/powerpoint/2010/main" xmlns:a14="http://schemas.microsoft.com/office/drawing/2010/main" w="9525">
                 <a:solidFill>
                   <a:srgbClr val="000000"/>
                 </a:solidFill>
@@ -6193,7 +6189,7 @@
                 <a16:creationId xmlns:a16="http://schemas.microsoft.com/office/drawing/2014/main" id="{26471DC7-FA6E-40EF-A167-93BB0BCE16AD}"/>
               </a:ext>
               <a:ext uri="{C183D7F6-B498-43B3-948B-1728B52AA6E4}">
-                <adec:decorative xmlns:adec="http://schemas.microsoft.com/office/drawing/2017/decorative" xmlns="" val="1"/>
+                <adec:decorative xmlns:adec="http://schemas.microsoft.com/office/drawing/2017/decorative" val="1"/>
               </a:ext>
             </a:extLst>
           </p:cNvPr>
@@ -6335,6 +6331,14 @@
 <file path=ppt/slides/slide13.xml><?xml version="1.0" encoding="utf-8"?>
 <p:sld xmlns:a="http://schemas.openxmlformats.org/drawingml/2006/main" xmlns:r="http://schemas.openxmlformats.org/officeDocument/2006/relationships" xmlns:p="http://schemas.openxmlformats.org/presentationml/2006/main">
   <p:cSld>
+    <p:bg>
+      <p:bgPr>
+        <a:solidFill>
+          <a:schemeClr val="bg2"/>
+        </a:solidFill>
+        <a:effectLst/>
+      </p:bgPr>
+    </p:bg>
     <p:spTree>
       <p:nvGrpSpPr>
         <p:cNvPr id="1" name=""/>
@@ -6351,61 +6355,98 @@
       </p:grpSpPr>
       <p:sp>
         <p:nvSpPr>
-          <p:cNvPr id="4" name="Titre 3">
+          <p:cNvPr id="10" name="Rectangle 9">
             <a:extLst>
               <a:ext uri="{FF2B5EF4-FFF2-40B4-BE49-F238E27FC236}">
-                <a16:creationId xmlns:a16="http://schemas.microsoft.com/office/drawing/2014/main" id="{97F5D228-F056-41E8-BE1E-4CC3432C5914}"/>
+                <a16:creationId xmlns:a16="http://schemas.microsoft.com/office/drawing/2014/main" id="{6A01907A-BF04-440F-BA0D-49BC9627344C}"/>
+              </a:ext>
+              <a:ext uri="{C183D7F6-B498-43B3-948B-1728B52AA6E4}">
+                <adec:decorative xmlns:adec="http://schemas.microsoft.com/office/drawing/2017/decorative" val="1"/>
               </a:ext>
             </a:extLst>
           </p:cNvPr>
           <p:cNvSpPr>
-            <a:spLocks noGrp="1"/>
-          </p:cNvSpPr>
-          <p:nvPr>
-            <p:ph type="title"/>
-          </p:nvPr>
-        </p:nvSpPr>
-        <p:spPr/>
-        <p:txBody>
-          <a:bodyPr/>
+            <a:spLocks noGrp="1" noRot="1" noChangeAspect="1" noMove="1" noResize="1" noEditPoints="1" noAdjustHandles="1" noChangeArrowheads="1" noChangeShapeType="1" noTextEdit="1"/>
+          </p:cNvSpPr>
+          <p:nvPr>
+            <p:extLst>
+              <p:ext uri="{386F3935-93C4-4BCD-93E2-E3B085C9AB24}">
+                <p16:designElem xmlns:p16="http://schemas.microsoft.com/office/powerpoint/2015/main" val="1"/>
+              </p:ext>
+            </p:extLst>
+          </p:nvPr>
+        </p:nvSpPr>
+        <p:spPr>
+          <a:xfrm>
+            <a:off x="0" y="0"/>
+            <a:ext cx="12192000" cy="6858000"/>
+          </a:xfrm>
+          <a:prstGeom prst="rect">
+            <a:avLst/>
+          </a:prstGeom>
+          <a:ln>
+            <a:noFill/>
+          </a:ln>
+        </p:spPr>
+        <p:style>
+          <a:lnRef idx="1">
+            <a:schemeClr val="dk1"/>
+          </a:lnRef>
+          <a:fillRef idx="3">
+            <a:schemeClr val="dk1"/>
+          </a:fillRef>
+          <a:effectRef idx="2">
+            <a:schemeClr val="dk1"/>
+          </a:effectRef>
+          <a:fontRef idx="minor">
+            <a:schemeClr val="lt1"/>
+          </a:fontRef>
+        </p:style>
+        <p:txBody>
+          <a:bodyPr rtlCol="0" anchor="ctr"/>
           <a:lstStyle/>
           <a:p>
-            <a:r>
-              <a:rPr lang="fr-FR" dirty="0"/>
-              <a:t>Diagramme de planification</a:t>
-            </a:r>
-          </a:p>
-        </p:txBody>
-      </p:sp>
-      <p:sp>
-        <p:nvSpPr>
+            <a:pPr algn="ctr"/>
+            <a:endParaRPr lang="en-US"/>
+          </a:p>
+        </p:txBody>
+      </p:sp>
+      <p:pic>
+        <p:nvPicPr>
           <p:cNvPr id="5" name="Espace réservé du contenu 4">
             <a:extLst>
               <a:ext uri="{FF2B5EF4-FFF2-40B4-BE49-F238E27FC236}">
-                <a16:creationId xmlns:a16="http://schemas.microsoft.com/office/drawing/2014/main" id="{85B3E982-8E18-45E1-B85B-C42C587A599D}"/>
+                <a16:creationId xmlns:a16="http://schemas.microsoft.com/office/drawing/2014/main" id="{B945844E-7FA3-4332-8D8F-FF0AF4080F3E}"/>
               </a:ext>
             </a:extLst>
           </p:cNvPr>
-          <p:cNvSpPr>
-            <a:spLocks noGrp="1"/>
-          </p:cNvSpPr>
+          <p:cNvPicPr>
+            <a:picLocks noGrp="1" noChangeAspect="1"/>
+          </p:cNvPicPr>
           <p:nvPr>
             <p:ph idx="1"/>
           </p:nvPr>
-        </p:nvSpPr>
-        <p:spPr/>
-        <p:txBody>
-          <a:bodyPr/>
-          <a:lstStyle/>
-          <a:p>
-            <a:endParaRPr lang="fr-FR" dirty="0"/>
-          </a:p>
-        </p:txBody>
-      </p:sp>
+        </p:nvPicPr>
+        <p:blipFill>
+          <a:blip r:embed="rId2"/>
+          <a:stretch>
+            <a:fillRect/>
+          </a:stretch>
+        </p:blipFill>
+        <p:spPr>
+          <a:xfrm>
+            <a:off x="933403" y="86219"/>
+            <a:ext cx="10325194" cy="6685562"/>
+          </a:xfrm>
+          <a:prstGeom prst="rect">
+            <a:avLst/>
+          </a:prstGeom>
+        </p:spPr>
+      </p:pic>
     </p:spTree>
     <p:extLst>
       <p:ext uri="{BB962C8B-B14F-4D97-AF65-F5344CB8AC3E}">
-        <p14:creationId xmlns:p14="http://schemas.microsoft.com/office/powerpoint/2010/main" val="635712282"/>
+        <p14:creationId xmlns:p14="http://schemas.microsoft.com/office/powerpoint/2010/main" val="1274234660"/>
       </p:ext>
     </p:extLst>
   </p:cSld>
@@ -6448,7 +6489,7 @@
                 <a16:creationId xmlns:a16="http://schemas.microsoft.com/office/drawing/2014/main" id="{E2264E67-6F59-4D8D-8E5F-8245B0FEAE76}"/>
               </a:ext>
               <a:ext uri="{C183D7F6-B498-43B3-948B-1728B52AA6E4}">
-                <adec:decorative xmlns:adec="http://schemas.microsoft.com/office/drawing/2017/decorative" xmlns="" val="1"/>
+                <adec:decorative xmlns:adec="http://schemas.microsoft.com/office/drawing/2017/decorative" val="1"/>
               </a:ext>
             </a:extLst>
           </p:cNvPr>
@@ -6511,7 +6552,7 @@
                 <a16:creationId xmlns:a16="http://schemas.microsoft.com/office/drawing/2014/main" id="{158E1C6E-D299-4F5D-B15B-155EBF7F62FD}"/>
               </a:ext>
               <a:ext uri="{C183D7F6-B498-43B3-948B-1728B52AA6E4}">
-                <adec:decorative xmlns:adec="http://schemas.microsoft.com/office/drawing/2017/decorative" xmlns="" val="1"/>
+                <adec:decorative xmlns:adec="http://schemas.microsoft.com/office/drawing/2017/decorative" val="1"/>
               </a:ext>
             </a:extLst>
           </p:cNvPr>
@@ -6862,7 +6903,7 @@
                 <a16:creationId xmlns:a16="http://schemas.microsoft.com/office/drawing/2014/main" id="{A416E3E5-5186-46A4-AFBD-337387D3163D}"/>
               </a:ext>
               <a:ext uri="{C183D7F6-B498-43B3-948B-1728B52AA6E4}">
-                <adec:decorative xmlns="" xmlns:adec="http://schemas.microsoft.com/office/drawing/2017/decorative" val="1"/>
+                <adec:decorative xmlns:adec="http://schemas.microsoft.com/office/drawing/2017/decorative" val="1"/>
               </a:ext>
             </a:extLst>
           </p:cNvPr>
@@ -6925,7 +6966,7 @@
                 <a16:creationId xmlns:a16="http://schemas.microsoft.com/office/drawing/2014/main" id="{7B8FAACC-353E-4F84-BA62-A5514185D9A9}"/>
               </a:ext>
               <a:ext uri="{C183D7F6-B498-43B3-948B-1728B52AA6E4}">
-                <adec:decorative xmlns="" xmlns:adec="http://schemas.microsoft.com/office/drawing/2017/decorative" val="1"/>
+                <adec:decorative xmlns:adec="http://schemas.microsoft.com/office/drawing/2017/decorative" val="1"/>
               </a:ext>
             </a:extLst>
           </p:cNvPr>
@@ -8012,7 +8053,7 @@
                 <a16:creationId xmlns:a16="http://schemas.microsoft.com/office/drawing/2014/main" id="{133F8CB7-795C-4272-9073-64D8CF97F220}"/>
               </a:ext>
               <a:ext uri="{C183D7F6-B498-43B3-948B-1728B52AA6E4}">
-                <adec:decorative xmlns="" xmlns:adec="http://schemas.microsoft.com/office/drawing/2017/decorative" val="1"/>
+                <adec:decorative xmlns:adec="http://schemas.microsoft.com/office/drawing/2017/decorative" val="1"/>
               </a:ext>
             </a:extLst>
           </p:cNvPr>
@@ -8099,7 +8140,7 @@
           <a:effectLst/>
           <a:extLst>
             <a:ext uri="{91240B29-F687-4f45-9708-019B960494DF}">
-              <a14:hiddenLine xmlns="" xmlns:a16="http://schemas.microsoft.com/office/drawing/2014/main" xmlns:p14="http://schemas.microsoft.com/office/powerpoint/2010/main" xmlns:a14="http://schemas.microsoft.com/office/drawing/2010/main" w="9525">
+              <a14:hiddenLine xmlns:a14="http://schemas.microsoft.com/office/drawing/2010/main" xmlns:p14="http://schemas.microsoft.com/office/powerpoint/2010/main" xmlns:a16="http://schemas.microsoft.com/office/drawing/2014/main" xmlns="" w="9525">
                 <a:solidFill>
                   <a:srgbClr val="000000"/>
                 </a:solidFill>
@@ -8133,7 +8174,7 @@
                 <a16:creationId xmlns:a16="http://schemas.microsoft.com/office/drawing/2014/main" id="{B7743172-17A8-4FA4-8434-B813E03B7665}"/>
               </a:ext>
               <a:ext uri="{C183D7F6-B498-43B3-948B-1728B52AA6E4}">
-                <adec:decorative xmlns="" xmlns:adec="http://schemas.microsoft.com/office/drawing/2017/decorative" val="1"/>
+                <adec:decorative xmlns:adec="http://schemas.microsoft.com/office/drawing/2017/decorative" val="1"/>
               </a:ext>
             </a:extLst>
           </p:cNvPr>
@@ -8196,7 +8237,7 @@
                 <a16:creationId xmlns:a16="http://schemas.microsoft.com/office/drawing/2014/main" id="{4CE1233C-FD2F-489E-BFDE-086F5FED6491}"/>
               </a:ext>
               <a:ext uri="{C183D7F6-B498-43B3-948B-1728B52AA6E4}">
-                <adec:decorative xmlns="" xmlns:adec="http://schemas.microsoft.com/office/drawing/2017/decorative" val="1"/>
+                <adec:decorative xmlns:adec="http://schemas.microsoft.com/office/drawing/2017/decorative" val="1"/>
               </a:ext>
             </a:extLst>
           </p:cNvPr>
@@ -8519,7 +8560,7 @@
                 <a16:creationId xmlns:a16="http://schemas.microsoft.com/office/drawing/2014/main" id="{133F8CB7-795C-4272-9073-64D8CF97F220}"/>
               </a:ext>
               <a:ext uri="{C183D7F6-B498-43B3-948B-1728B52AA6E4}">
-                <adec:decorative xmlns="" xmlns:adec="http://schemas.microsoft.com/office/drawing/2017/decorative" val="1"/>
+                <adec:decorative xmlns:adec="http://schemas.microsoft.com/office/drawing/2017/decorative" val="1"/>
               </a:ext>
             </a:extLst>
           </p:cNvPr>
@@ -8606,7 +8647,7 @@
           <a:effectLst/>
           <a:extLst>
             <a:ext uri="{91240B29-F687-4f45-9708-019B960494DF}">
-              <a14:hiddenLine xmlns="" xmlns:a16="http://schemas.microsoft.com/office/drawing/2014/main" xmlns:p14="http://schemas.microsoft.com/office/powerpoint/2010/main" xmlns:a14="http://schemas.microsoft.com/office/drawing/2010/main" w="9525">
+              <a14:hiddenLine xmlns:a14="http://schemas.microsoft.com/office/drawing/2010/main" xmlns:p14="http://schemas.microsoft.com/office/powerpoint/2010/main" xmlns:a16="http://schemas.microsoft.com/office/drawing/2014/main" xmlns="" w="9525">
                 <a:solidFill>
                   <a:srgbClr val="000000"/>
                 </a:solidFill>
@@ -8689,7 +8730,7 @@
                 <a16:creationId xmlns:a16="http://schemas.microsoft.com/office/drawing/2014/main" id="{9674F1F8-962D-4FF5-B378-D9D2FFDFD27E}"/>
               </a:ext>
               <a:ext uri="{C183D7F6-B498-43B3-948B-1728B52AA6E4}">
-                <adec:decorative xmlns="" xmlns:adec="http://schemas.microsoft.com/office/drawing/2017/decorative" val="1"/>
+                <adec:decorative xmlns:adec="http://schemas.microsoft.com/office/drawing/2017/decorative" val="1"/>
               </a:ext>
             </a:extLst>
           </p:cNvPr>
@@ -8917,7 +8958,7 @@
                 <a16:creationId xmlns:a16="http://schemas.microsoft.com/office/drawing/2014/main" id="{C701CDB4-05E2-481A-9165-2455B6FE22A8}"/>
               </a:ext>
               <a:ext uri="{C183D7F6-B498-43B3-948B-1728B52AA6E4}">
-                <adec:decorative xmlns="" xmlns:adec="http://schemas.microsoft.com/office/drawing/2017/decorative" val="1"/>
+                <adec:decorative xmlns:adec="http://schemas.microsoft.com/office/drawing/2017/decorative" val="1"/>
               </a:ext>
             </a:extLst>
           </p:cNvPr>
@@ -8980,7 +9021,7 @@
                 <a16:creationId xmlns:a16="http://schemas.microsoft.com/office/drawing/2014/main" id="{93C43E0F-EC0A-4928-BA40-42313C09961E}"/>
               </a:ext>
               <a:ext uri="{C183D7F6-B498-43B3-948B-1728B52AA6E4}">
-                <adec:decorative xmlns="" xmlns:adec="http://schemas.microsoft.com/office/drawing/2017/decorative" val="1"/>
+                <adec:decorative xmlns:adec="http://schemas.microsoft.com/office/drawing/2017/decorative" val="1"/>
               </a:ext>
             </a:extLst>
           </p:cNvPr>
@@ -9116,7 +9157,7 @@
                 <a16:creationId xmlns:a16="http://schemas.microsoft.com/office/drawing/2014/main" id="{133F8CB7-795C-4272-9073-64D8CF97F220}"/>
               </a:ext>
               <a:ext uri="{C183D7F6-B498-43B3-948B-1728B52AA6E4}">
-                <adec:decorative xmlns="" xmlns:adec="http://schemas.microsoft.com/office/drawing/2017/decorative" val="1"/>
+                <adec:decorative xmlns:adec="http://schemas.microsoft.com/office/drawing/2017/decorative" val="1"/>
               </a:ext>
             </a:extLst>
           </p:cNvPr>
@@ -9203,7 +9244,7 @@
           <a:effectLst/>
           <a:extLst>
             <a:ext uri="{91240B29-F687-4f45-9708-019B960494DF}">
-              <a14:hiddenLine xmlns="" xmlns:a16="http://schemas.microsoft.com/office/drawing/2014/main" xmlns:p14="http://schemas.microsoft.com/office/powerpoint/2010/main" xmlns:a14="http://schemas.microsoft.com/office/drawing/2010/main" w="9525">
+              <a14:hiddenLine xmlns:a14="http://schemas.microsoft.com/office/drawing/2010/main" xmlns:p14="http://schemas.microsoft.com/office/powerpoint/2010/main" xmlns:a16="http://schemas.microsoft.com/office/drawing/2014/main" xmlns="" w="9525">
                 <a:solidFill>
                   <a:srgbClr val="000000"/>
                 </a:solidFill>
@@ -9237,7 +9278,7 @@
                 <a16:creationId xmlns:a16="http://schemas.microsoft.com/office/drawing/2014/main" id="{B7743172-17A8-4FA4-8434-B813E03B7665}"/>
               </a:ext>
               <a:ext uri="{C183D7F6-B498-43B3-948B-1728B52AA6E4}">
-                <adec:decorative xmlns="" xmlns:adec="http://schemas.microsoft.com/office/drawing/2017/decorative" val="1"/>
+                <adec:decorative xmlns:adec="http://schemas.microsoft.com/office/drawing/2017/decorative" val="1"/>
               </a:ext>
             </a:extLst>
           </p:cNvPr>
@@ -9300,7 +9341,7 @@
                 <a16:creationId xmlns:a16="http://schemas.microsoft.com/office/drawing/2014/main" id="{4CE1233C-FD2F-489E-BFDE-086F5FED6491}"/>
               </a:ext>
               <a:ext uri="{C183D7F6-B498-43B3-948B-1728B52AA6E4}">
-                <adec:decorative xmlns="" xmlns:adec="http://schemas.microsoft.com/office/drawing/2017/decorative" val="1"/>
+                <adec:decorative xmlns:adec="http://schemas.microsoft.com/office/drawing/2017/decorative" val="1"/>
               </a:ext>
             </a:extLst>
           </p:cNvPr>
@@ -9618,7 +9659,7 @@
                 <a16:creationId xmlns:a16="http://schemas.microsoft.com/office/drawing/2014/main" id="{E7597382-59B5-427B-9E49-55383F0A5561}"/>
               </a:ext>
               <a:ext uri="{C183D7F6-B498-43B3-948B-1728B52AA6E4}">
-                <adec:decorative xmlns:adec="http://schemas.microsoft.com/office/drawing/2017/decorative" xmlns="" val="1"/>
+                <adec:decorative xmlns:adec="http://schemas.microsoft.com/office/drawing/2017/decorative" val="1"/>
               </a:ext>
             </a:extLst>
           </p:cNvPr>
@@ -9706,7 +9747,7 @@
           </a:ln>
           <a:extLst>
             <a:ext uri="{91240B29-F687-4f45-9708-019B960494DF}">
-              <a14:hiddenLine xmlns:a14="http://schemas.microsoft.com/office/drawing/2010/main" xmlns:p14="http://schemas.microsoft.com/office/powerpoint/2010/main" xmlns:a16="http://schemas.microsoft.com/office/drawing/2014/main" xmlns="" w="9525">
+              <a14:hiddenLine xmlns="" xmlns:a16="http://schemas.microsoft.com/office/drawing/2014/main" xmlns:p14="http://schemas.microsoft.com/office/powerpoint/2010/main" xmlns:a14="http://schemas.microsoft.com/office/drawing/2010/main" w="9525">
                 <a:solidFill>
                   <a:srgbClr val="000000"/>
                 </a:solidFill>
@@ -9740,7 +9781,7 @@
                 <a16:creationId xmlns:a16="http://schemas.microsoft.com/office/drawing/2014/main" id="{26471DC7-FA6E-40EF-A167-93BB0BCE16AD}"/>
               </a:ext>
               <a:ext uri="{C183D7F6-B498-43B3-948B-1728B52AA6E4}">
-                <adec:decorative xmlns:adec="http://schemas.microsoft.com/office/drawing/2017/decorative" xmlns="" val="1"/>
+                <adec:decorative xmlns:adec="http://schemas.microsoft.com/office/drawing/2017/decorative" val="1"/>
               </a:ext>
             </a:extLst>
           </p:cNvPr>
@@ -10170,13 +10211,13 @@
 
 <file path=customXml/item2.xml><?xml version="1.0" encoding="utf-8"?>
 <Control xmlns="http://schemas.microsoft.com/VisualStudio/2011/storyboarding/control">
-  <Id Name="System.Storyboarding.WindowsDesktop.ListItemSmall" Revision="1" Stencil="System.Storyboarding.WindowsDesktop" StencilVersion="0.1"/>
+  <Id Name="System.Storyboarding.Annotation.StickyNote" Revision="1" Stencil="System.Storyboarding.Annotation" StencilVersion="0.1"/>
 </Control>
 </file>
 
 <file path=customXml/item3.xml><?xml version="1.0" encoding="utf-8"?>
 <Control xmlns="http://schemas.microsoft.com/VisualStudio/2011/storyboarding/control">
-  <Id Name="System.Storyboarding.Annotation.StickyNote" Revision="1" Stencil="System.Storyboarding.Annotation" StencilVersion="0.1"/>
+  <Id Name="System.Storyboarding.WindowsDesktop.ListItemSmall" Revision="1" Stencil="System.Storyboarding.WindowsDesktop" StencilVersion="0.1"/>
 </Control>
 </file>
 
@@ -10189,7 +10230,7 @@
 </file>
 
 <file path=customXml/itemProps2.xml><?xml version="1.0" encoding="utf-8"?>
-<ds:datastoreItem xmlns:ds="http://schemas.openxmlformats.org/officeDocument/2006/customXml" ds:itemID="{DBB0DF8D-2F1D-49BB-82C3-7B45422639DA}">
+<ds:datastoreItem xmlns:ds="http://schemas.openxmlformats.org/officeDocument/2006/customXml" ds:itemID="{853018AC-5FAD-4FD3-9EDF-33F2B2469FEE}">
   <ds:schemaRefs>
     <ds:schemaRef ds:uri="http://schemas.microsoft.com/VisualStudio/2011/storyboarding/control"/>
   </ds:schemaRefs>
@@ -10197,7 +10238,7 @@
 </file>
 
 <file path=customXml/itemProps3.xml><?xml version="1.0" encoding="utf-8"?>
-<ds:datastoreItem xmlns:ds="http://schemas.openxmlformats.org/officeDocument/2006/customXml" ds:itemID="{853018AC-5FAD-4FD3-9EDF-33F2B2469FEE}">
+<ds:datastoreItem xmlns:ds="http://schemas.openxmlformats.org/officeDocument/2006/customXml" ds:itemID="{DBB0DF8D-2F1D-49BB-82C3-7B45422639DA}">
   <ds:schemaRefs>
     <ds:schemaRef ds:uri="http://schemas.microsoft.com/VisualStudio/2011/storyboarding/control"/>
   </ds:schemaRefs>

</xml_diff>